<commit_message>
slightly updated version of the project
</commit_message>
<xml_diff>
--- a/Presentation.pptx
+++ b/Presentation.pptx
@@ -8,7 +8,9 @@
     <p:sldId id="256" r:id="rId2"/>
     <p:sldId id="258" r:id="rId3"/>
     <p:sldId id="257" r:id="rId4"/>
-    <p:sldId id="259" r:id="rId5"/>
+    <p:sldId id="260" r:id="rId5"/>
+    <p:sldId id="261" r:id="rId6"/>
+    <p:sldId id="259" r:id="rId7"/>
   </p:sldIdLst>
   <p:sldSz cx="12192000" cy="6858000"/>
   <p:notesSz cx="6858000" cy="9144000"/>
@@ -3714,12 +3716,21 @@
           </a:xfrm>
         </p:spPr>
         <p:txBody>
-          <a:bodyPr/>
+          <a:bodyPr>
+            <a:normAutofit fontScale="92500" lnSpcReduction="10000"/>
+          </a:bodyPr>
           <a:lstStyle/>
           <a:p>
             <a:r>
               <a:rPr lang="en-GB" dirty="0"/>
-              <a:t>Movement – WASD and SPACE</a:t>
+              <a:t>Movement and Jump</a:t>
+            </a:r>
+          </a:p>
+          <a:p>
+            <a:pPr lvl="1"/>
+            <a:r>
+              <a:rPr lang="en-GB" dirty="0"/>
+              <a:t>WASD and SPACE</a:t>
             </a:r>
           </a:p>
           <a:p>
@@ -3760,14 +3771,14 @@
             <a:pPr lvl="1"/>
             <a:r>
               <a:rPr lang="en-GB" dirty="0"/>
-              <a:t>Impact Velocity</a:t>
+              <a:t>Impact Force</a:t>
             </a:r>
           </a:p>
           <a:p>
             <a:pPr lvl="2"/>
             <a:r>
               <a:rPr lang="en-GB" dirty="0"/>
-              <a:t>for stationary pins</a:t>
+              <a:t>For spring-like pins</a:t>
             </a:r>
           </a:p>
           <a:p>
@@ -3894,19 +3905,28 @@
         </p:nvSpPr>
         <p:spPr/>
         <p:txBody>
-          <a:bodyPr/>
+          <a:bodyPr>
+            <a:normAutofit/>
+          </a:bodyPr>
           <a:lstStyle/>
           <a:p>
             <a:r>
               <a:rPr lang="en-GB" dirty="0"/>
-              <a:t>Unity Physics Engine</a:t>
+              <a:t>Unity Physics Engine (player input)</a:t>
             </a:r>
           </a:p>
           <a:p>
             <a:pPr lvl="1"/>
             <a:r>
               <a:rPr lang="en-GB" dirty="0"/>
-              <a:t>Force is added when WASD keys are held down (movement)</a:t>
+              <a:t>Force applied in four directions (forward, backward, left, right) each frame (movement)</a:t>
+            </a:r>
+          </a:p>
+          <a:p>
+            <a:pPr lvl="1"/>
+            <a:r>
+              <a:rPr lang="en-GB" dirty="0"/>
+              <a:t>Force applied once in the up direction (jump)</a:t>
             </a:r>
           </a:p>
           <a:p>
@@ -3919,20 +3939,20 @@
             <a:pPr lvl="1"/>
             <a:r>
               <a:rPr lang="en-GB" dirty="0"/>
-              <a:t>Force applied in opposite direction of contact normal with walls</a:t>
+              <a:t>Dampened force applied in opposite direction of contact normal with static objects (walls, floor)</a:t>
             </a:r>
           </a:p>
           <a:p>
             <a:r>
               <a:rPr lang="en-GB" dirty="0"/>
-              <a:t>Stretching (Hooke’s Law)</a:t>
+              <a:t>Pin Stretch (Hooke’s Law)</a:t>
             </a:r>
           </a:p>
           <a:p>
             <a:pPr lvl="1"/>
             <a:r>
               <a:rPr lang="en-GB" dirty="0"/>
-              <a:t>On impact with stationary pins, velocity impulse is applied (to show spring stretch)</a:t>
+              <a:t>On impact with stationary springy pins</a:t>
             </a:r>
           </a:p>
           <a:p>
@@ -3954,6 +3974,371 @@
 </file>
 
 <file path=ppt/slides/slide4.xml><?xml version="1.0" encoding="utf-8"?>
+<p:sld xmlns:a="http://schemas.openxmlformats.org/drawingml/2006/main" xmlns:r="http://schemas.openxmlformats.org/officeDocument/2006/relationships" xmlns:p="http://schemas.openxmlformats.org/presentationml/2006/main">
+  <p:cSld>
+    <p:spTree>
+      <p:nvGrpSpPr>
+        <p:cNvPr id="1" name=""/>
+        <p:cNvGrpSpPr/>
+        <p:nvPr/>
+      </p:nvGrpSpPr>
+      <p:grpSpPr>
+        <a:xfrm>
+          <a:off x="0" y="0"/>
+          <a:ext cx="0" cy="0"/>
+          <a:chOff x="0" y="0"/>
+          <a:chExt cx="0" cy="0"/>
+        </a:xfrm>
+      </p:grpSpPr>
+      <p:sp>
+        <p:nvSpPr>
+          <p:cNvPr id="2" name="Title 1">
+            <a:extLst>
+              <a:ext uri="{FF2B5EF4-FFF2-40B4-BE49-F238E27FC236}">
+                <a16:creationId xmlns:a16="http://schemas.microsoft.com/office/drawing/2014/main" id="{136245A7-5589-47AC-9B96-F8A5F11F7DD0}"/>
+              </a:ext>
+            </a:extLst>
+          </p:cNvPr>
+          <p:cNvSpPr>
+            <a:spLocks noGrp="1"/>
+          </p:cNvSpPr>
+          <p:nvPr>
+            <p:ph type="title"/>
+          </p:nvPr>
+        </p:nvSpPr>
+        <p:spPr/>
+        <p:txBody>
+          <a:bodyPr wrap="square">
+            <a:normAutofit/>
+          </a:bodyPr>
+          <a:lstStyle/>
+          <a:p>
+            <a:r>
+              <a:rPr lang="en-GB" dirty="0">
+                <a:latin typeface="+mn-lt"/>
+              </a:rPr>
+              <a:t>BOUNCE</a:t>
+            </a:r>
+          </a:p>
+        </p:txBody>
+      </p:sp>
+      <p:sp>
+        <p:nvSpPr>
+          <p:cNvPr id="3" name="Content Placeholder 2">
+            <a:extLst>
+              <a:ext uri="{FF2B5EF4-FFF2-40B4-BE49-F238E27FC236}">
+                <a16:creationId xmlns:a16="http://schemas.microsoft.com/office/drawing/2014/main" id="{22E41D40-7EF6-4F83-92BA-670C9E0E13A4}"/>
+              </a:ext>
+            </a:extLst>
+          </p:cNvPr>
+          <p:cNvSpPr>
+            <a:spLocks noGrp="1"/>
+          </p:cNvSpPr>
+          <p:nvPr>
+            <p:ph idx="1"/>
+          </p:nvPr>
+        </p:nvSpPr>
+        <p:spPr/>
+        <p:txBody>
+          <a:bodyPr>
+            <a:normAutofit/>
+          </a:bodyPr>
+          <a:lstStyle/>
+          <a:p>
+            <a:pPr marL="0" indent="0">
+              <a:buNone/>
+            </a:pPr>
+            <a:r>
+              <a:rPr lang="en-GB" dirty="0"/>
+              <a:t>Works only with static, non-rigid body objects (walls, floor)</a:t>
+            </a:r>
+          </a:p>
+          <a:p>
+            <a:pPr marL="0" indent="0" algn="ctr">
+              <a:buNone/>
+            </a:pPr>
+            <a:r>
+              <a:rPr lang="en-GB" sz="1600" dirty="0"/>
+              <a:t>n – contact normal</a:t>
+            </a:r>
+          </a:p>
+          <a:p>
+            <a:pPr marL="0" indent="0" algn="ctr">
+              <a:buNone/>
+            </a:pPr>
+            <a:r>
+              <a:rPr lang="en-GB" sz="1600" dirty="0"/>
+              <a:t>C – damp coefficient</a:t>
+            </a:r>
+          </a:p>
+          <a:p>
+            <a:pPr marL="0" indent="0">
+              <a:buNone/>
+            </a:pPr>
+            <a:r>
+              <a:rPr lang="en-GB" dirty="0"/>
+              <a:t>Calculate impulse </a:t>
+            </a:r>
+            <a:r>
+              <a:rPr lang="en-GB" b="1" dirty="0"/>
+              <a:t>I</a:t>
+            </a:r>
+          </a:p>
+          <a:p>
+            <a:pPr marL="0" indent="0" algn="ctr">
+              <a:buNone/>
+            </a:pPr>
+            <a:r>
+              <a:rPr lang="en-GB" dirty="0"/>
+              <a:t>I = -n * ( v(t) • n ) </a:t>
+            </a:r>
+          </a:p>
+          <a:p>
+            <a:pPr marL="0" indent="0">
+              <a:buNone/>
+            </a:pPr>
+            <a:r>
+              <a:rPr lang="en-GB" dirty="0"/>
+              <a:t>Calculate bounce velocity </a:t>
+            </a:r>
+            <a:r>
+              <a:rPr lang="en-GB" b="1" dirty="0"/>
+              <a:t>v</a:t>
+            </a:r>
+            <a:r>
+              <a:rPr lang="en-GB" dirty="0"/>
+              <a:t> on impact (C – bounce or damp coefficient):</a:t>
+            </a:r>
+          </a:p>
+          <a:p>
+            <a:pPr marL="0" indent="0" algn="ctr">
+              <a:buNone/>
+            </a:pPr>
+            <a:r>
+              <a:rPr lang="en-GB" dirty="0"/>
+              <a:t>v(t) = v(t) + I + I * C</a:t>
+            </a:r>
+          </a:p>
+        </p:txBody>
+      </p:sp>
+    </p:spTree>
+    <p:extLst>
+      <p:ext uri="{BB962C8B-B14F-4D97-AF65-F5344CB8AC3E}">
+        <p14:creationId xmlns:p14="http://schemas.microsoft.com/office/powerpoint/2010/main" val="699649336"/>
+      </p:ext>
+    </p:extLst>
+  </p:cSld>
+  <p:clrMapOvr>
+    <a:masterClrMapping/>
+  </p:clrMapOvr>
+</p:sld>
+</file>
+
+<file path=ppt/slides/slide5.xml><?xml version="1.0" encoding="utf-8"?>
+<p:sld xmlns:a="http://schemas.openxmlformats.org/drawingml/2006/main" xmlns:r="http://schemas.openxmlformats.org/officeDocument/2006/relationships" xmlns:p="http://schemas.openxmlformats.org/presentationml/2006/main">
+  <p:cSld>
+    <p:spTree>
+      <p:nvGrpSpPr>
+        <p:cNvPr id="1" name=""/>
+        <p:cNvGrpSpPr/>
+        <p:nvPr/>
+      </p:nvGrpSpPr>
+      <p:grpSpPr>
+        <a:xfrm>
+          <a:off x="0" y="0"/>
+          <a:ext cx="0" cy="0"/>
+          <a:chOff x="0" y="0"/>
+          <a:chExt cx="0" cy="0"/>
+        </a:xfrm>
+      </p:grpSpPr>
+      <p:sp>
+        <p:nvSpPr>
+          <p:cNvPr id="2" name="Title 1">
+            <a:extLst>
+              <a:ext uri="{FF2B5EF4-FFF2-40B4-BE49-F238E27FC236}">
+                <a16:creationId xmlns:a16="http://schemas.microsoft.com/office/drawing/2014/main" id="{136245A7-5589-47AC-9B96-F8A5F11F7DD0}"/>
+              </a:ext>
+            </a:extLst>
+          </p:cNvPr>
+          <p:cNvSpPr>
+            <a:spLocks noGrp="1"/>
+          </p:cNvSpPr>
+          <p:nvPr>
+            <p:ph type="title"/>
+          </p:nvPr>
+        </p:nvSpPr>
+        <p:spPr/>
+        <p:txBody>
+          <a:bodyPr wrap="square">
+            <a:normAutofit/>
+          </a:bodyPr>
+          <a:lstStyle/>
+          <a:p>
+            <a:r>
+              <a:rPr lang="en-GB" dirty="0">
+                <a:latin typeface="+mn-lt"/>
+              </a:rPr>
+              <a:t>PIN STRETCH</a:t>
+            </a:r>
+          </a:p>
+        </p:txBody>
+      </p:sp>
+      <p:sp>
+        <p:nvSpPr>
+          <p:cNvPr id="3" name="Content Placeholder 2">
+            <a:extLst>
+              <a:ext uri="{FF2B5EF4-FFF2-40B4-BE49-F238E27FC236}">
+                <a16:creationId xmlns:a16="http://schemas.microsoft.com/office/drawing/2014/main" id="{22E41D40-7EF6-4F83-92BA-670C9E0E13A4}"/>
+              </a:ext>
+            </a:extLst>
+          </p:cNvPr>
+          <p:cNvSpPr>
+            <a:spLocks noGrp="1"/>
+          </p:cNvSpPr>
+          <p:nvPr>
+            <p:ph idx="1"/>
+          </p:nvPr>
+        </p:nvSpPr>
+        <p:spPr>
+          <a:xfrm>
+            <a:off x="1451579" y="2015732"/>
+            <a:ext cx="9603275" cy="4189759"/>
+          </a:xfrm>
+        </p:spPr>
+        <p:txBody>
+          <a:bodyPr>
+            <a:normAutofit fontScale="92500" lnSpcReduction="20000"/>
+          </a:bodyPr>
+          <a:lstStyle/>
+          <a:p>
+            <a:pPr marL="0" indent="0">
+              <a:buNone/>
+            </a:pPr>
+            <a:r>
+              <a:rPr lang="en-GB" dirty="0"/>
+              <a:t>With the help of Hooke’s Law</a:t>
+            </a:r>
+          </a:p>
+          <a:p>
+            <a:pPr lvl="1"/>
+            <a:r>
+              <a:rPr lang="en-GB" dirty="0"/>
+              <a:t>The pin bottom is fixed</a:t>
+            </a:r>
+          </a:p>
+          <a:p>
+            <a:pPr lvl="1"/>
+            <a:r>
+              <a:rPr lang="en-GB" dirty="0"/>
+              <a:t>The pin </a:t>
+            </a:r>
+            <a:r>
+              <a:rPr lang="en-GB" b="1" dirty="0"/>
+              <a:t>Y</a:t>
+            </a:r>
+            <a:r>
+              <a:rPr lang="en-GB" dirty="0"/>
+              <a:t> scale represents the displacement </a:t>
+            </a:r>
+            <a:r>
+              <a:rPr lang="en-GB" b="1" dirty="0"/>
+              <a:t>d</a:t>
+            </a:r>
+            <a:r>
+              <a:rPr lang="en-GB" dirty="0"/>
+              <a:t> + rest position</a:t>
+            </a:r>
+          </a:p>
+          <a:p>
+            <a:pPr marL="0" indent="0">
+              <a:buNone/>
+            </a:pPr>
+            <a:r>
+              <a:rPr lang="en-GB" dirty="0"/>
+              <a:t>m = 1	</a:t>
+            </a:r>
+          </a:p>
+          <a:p>
+            <a:pPr marL="0" indent="0">
+              <a:buNone/>
+            </a:pPr>
+            <a:r>
+              <a:rPr lang="en-GB" sz="1800" dirty="0"/>
+              <a:t>K = 39.2N</a:t>
+            </a:r>
+          </a:p>
+          <a:p>
+            <a:pPr marL="0" indent="0">
+              <a:buNone/>
+            </a:pPr>
+            <a:r>
+              <a:rPr lang="en-GB" sz="1800" dirty="0"/>
+              <a:t>C – varying damp coefficient</a:t>
+            </a:r>
+          </a:p>
+          <a:p>
+            <a:pPr marL="0" indent="0">
+              <a:buNone/>
+            </a:pPr>
+            <a:r>
+              <a:rPr lang="en-GB" sz="1600" dirty="0"/>
+              <a:t>dt = 0.016s (simulation independent from Unity’s physics)</a:t>
+            </a:r>
+          </a:p>
+          <a:p>
+            <a:pPr marL="0" indent="0">
+              <a:buNone/>
+            </a:pPr>
+            <a:endParaRPr lang="en-GB" sz="1600" dirty="0"/>
+          </a:p>
+          <a:p>
+            <a:pPr marL="0" indent="0" algn="ctr">
+              <a:buNone/>
+            </a:pPr>
+            <a:r>
+              <a:rPr lang="en-US" sz="1600" dirty="0"/>
+              <a:t>F = f(t + dt)</a:t>
+            </a:r>
+            <a:r>
+              <a:rPr lang="en-GB" sz="1600" dirty="0"/>
+              <a:t> = f(t) -9.8 – K * d(t)</a:t>
+            </a:r>
+          </a:p>
+          <a:p>
+            <a:pPr marL="0" indent="0" algn="ctr">
+              <a:buNone/>
+            </a:pPr>
+            <a:r>
+              <a:rPr lang="en-GB" sz="1600" dirty="0"/>
+              <a:t>D = d(t + dt) = d(t) + ( F – F * C ) / K * dt</a:t>
+            </a:r>
+          </a:p>
+          <a:p>
+            <a:pPr marL="0" indent="0" algn="ctr">
+              <a:buNone/>
+            </a:pPr>
+            <a:r>
+              <a:rPr lang="en-GB" sz="1600" dirty="0"/>
+              <a:t>Y = y(t + dt) = (1 + D) * y(0)</a:t>
+            </a:r>
+            <a:endParaRPr lang="en-GB" dirty="0"/>
+          </a:p>
+        </p:txBody>
+      </p:sp>
+    </p:spTree>
+    <p:extLst>
+      <p:ext uri="{BB962C8B-B14F-4D97-AF65-F5344CB8AC3E}">
+        <p14:creationId xmlns:p14="http://schemas.microsoft.com/office/powerpoint/2010/main" val="158065934"/>
+      </p:ext>
+    </p:extLst>
+  </p:cSld>
+  <p:clrMapOvr>
+    <a:masterClrMapping/>
+  </p:clrMapOvr>
+</p:sld>
+</file>
+
+<file path=ppt/slides/slide6.xml><?xml version="1.0" encoding="utf-8"?>
 <p:sld xmlns:a="http://schemas.openxmlformats.org/drawingml/2006/main" xmlns:r="http://schemas.openxmlformats.org/officeDocument/2006/relationships" xmlns:p="http://schemas.openxmlformats.org/presentationml/2006/main">
   <p:cSld>
     <p:spTree>

</xml_diff>